<commit_message>
More changes to the second draft
</commit_message>
<xml_diff>
--- a/Assignment 3/updatedSecondDraft.pptx
+++ b/Assignment 3/updatedSecondDraft.pptx
@@ -105,6 +105,11 @@
       </a:defRPr>
     </a:lvl9pPr>
   </p:defaultTextStyle>
+  <p:extLst>
+    <p:ext uri="{EFAFB233-063F-42B5-8137-9DF3F51BA10A}">
+      <p15:sldGuideLst xmlns:p15="http://schemas.microsoft.com/office/powerpoint/2012/main"/>
+    </p:ext>
+  </p:extLst>
 </p:presentation>
 </file>
 
@@ -255,7 +260,7 @@
           <a:p>
             <a:fld id="{0B51B2B2-61EB-F840-97D6-5435ACE1DE3B}" type="datetimeFigureOut">
               <a:rPr lang="en-US" smtClean="0"/>
-              <a:t>3/30/21</a:t>
+              <a:t>4/5/21</a:t>
             </a:fld>
             <a:endParaRPr lang="en-US"/>
           </a:p>
@@ -453,7 +458,7 @@
           <a:p>
             <a:fld id="{0B51B2B2-61EB-F840-97D6-5435ACE1DE3B}" type="datetimeFigureOut">
               <a:rPr lang="en-US" smtClean="0"/>
-              <a:t>3/30/21</a:t>
+              <a:t>4/5/21</a:t>
             </a:fld>
             <a:endParaRPr lang="en-US"/>
           </a:p>
@@ -661,7 +666,7 @@
           <a:p>
             <a:fld id="{0B51B2B2-61EB-F840-97D6-5435ACE1DE3B}" type="datetimeFigureOut">
               <a:rPr lang="en-US" smtClean="0"/>
-              <a:t>3/30/21</a:t>
+              <a:t>4/5/21</a:t>
             </a:fld>
             <a:endParaRPr lang="en-US"/>
           </a:p>
@@ -859,7 +864,7 @@
           <a:p>
             <a:fld id="{0B51B2B2-61EB-F840-97D6-5435ACE1DE3B}" type="datetimeFigureOut">
               <a:rPr lang="en-US" smtClean="0"/>
-              <a:t>3/30/21</a:t>
+              <a:t>4/5/21</a:t>
             </a:fld>
             <a:endParaRPr lang="en-US"/>
           </a:p>
@@ -1134,7 +1139,7 @@
           <a:p>
             <a:fld id="{0B51B2B2-61EB-F840-97D6-5435ACE1DE3B}" type="datetimeFigureOut">
               <a:rPr lang="en-US" smtClean="0"/>
-              <a:t>3/30/21</a:t>
+              <a:t>4/5/21</a:t>
             </a:fld>
             <a:endParaRPr lang="en-US"/>
           </a:p>
@@ -1399,7 +1404,7 @@
           <a:p>
             <a:fld id="{0B51B2B2-61EB-F840-97D6-5435ACE1DE3B}" type="datetimeFigureOut">
               <a:rPr lang="en-US" smtClean="0"/>
-              <a:t>3/30/21</a:t>
+              <a:t>4/5/21</a:t>
             </a:fld>
             <a:endParaRPr lang="en-US"/>
           </a:p>
@@ -1811,7 +1816,7 @@
           <a:p>
             <a:fld id="{0B51B2B2-61EB-F840-97D6-5435ACE1DE3B}" type="datetimeFigureOut">
               <a:rPr lang="en-US" smtClean="0"/>
-              <a:t>3/30/21</a:t>
+              <a:t>4/5/21</a:t>
             </a:fld>
             <a:endParaRPr lang="en-US"/>
           </a:p>
@@ -1952,7 +1957,7 @@
           <a:p>
             <a:fld id="{0B51B2B2-61EB-F840-97D6-5435ACE1DE3B}" type="datetimeFigureOut">
               <a:rPr lang="en-US" smtClean="0"/>
-              <a:t>3/30/21</a:t>
+              <a:t>4/5/21</a:t>
             </a:fld>
             <a:endParaRPr lang="en-US"/>
           </a:p>
@@ -2065,7 +2070,7 @@
           <a:p>
             <a:fld id="{0B51B2B2-61EB-F840-97D6-5435ACE1DE3B}" type="datetimeFigureOut">
               <a:rPr lang="en-US" smtClean="0"/>
-              <a:t>3/30/21</a:t>
+              <a:t>4/5/21</a:t>
             </a:fld>
             <a:endParaRPr lang="en-US"/>
           </a:p>
@@ -2376,7 +2381,7 @@
           <a:p>
             <a:fld id="{0B51B2B2-61EB-F840-97D6-5435ACE1DE3B}" type="datetimeFigureOut">
               <a:rPr lang="en-US" smtClean="0"/>
-              <a:t>3/30/21</a:t>
+              <a:t>4/5/21</a:t>
             </a:fld>
             <a:endParaRPr lang="en-US"/>
           </a:p>
@@ -2664,7 +2669,7 @@
           <a:p>
             <a:fld id="{0B51B2B2-61EB-F840-97D6-5435ACE1DE3B}" type="datetimeFigureOut">
               <a:rPr lang="en-US" smtClean="0"/>
-              <a:t>3/30/21</a:t>
+              <a:t>4/5/21</a:t>
             </a:fld>
             <a:endParaRPr lang="en-US"/>
           </a:p>
@@ -2905,7 +2910,7 @@
           <a:p>
             <a:fld id="{0B51B2B2-61EB-F840-97D6-5435ACE1DE3B}" type="datetimeFigureOut">
               <a:rPr lang="en-US" smtClean="0"/>
-              <a:t>3/30/21</a:t>
+              <a:t>4/5/21</a:t>
             </a:fld>
             <a:endParaRPr lang="en-US"/>
           </a:p>
@@ -4037,8 +4042,8 @@
         </p:nvSpPr>
         <p:spPr>
           <a:xfrm>
-            <a:off x="4643677" y="1634432"/>
-            <a:ext cx="4563184" cy="4160507"/>
+            <a:off x="4643676" y="1634432"/>
+            <a:ext cx="4654417" cy="4238884"/>
           </a:xfrm>
           <a:prstGeom prst="roundRect">
             <a:avLst/>
@@ -4202,7 +4207,7 @@
         </p:nvSpPr>
         <p:spPr>
           <a:xfrm>
-            <a:off x="4835422" y="2706406"/>
+            <a:off x="4835422" y="2575776"/>
             <a:ext cx="274320" cy="313513"/>
           </a:xfrm>
           <a:prstGeom prst="ellipse">
@@ -4252,7 +4257,7 @@
         </p:nvCxnSpPr>
         <p:spPr>
           <a:xfrm>
-            <a:off x="5109742" y="2863163"/>
+            <a:off x="5109742" y="2732533"/>
             <a:ext cx="990601" cy="2780"/>
           </a:xfrm>
           <a:prstGeom prst="straightConnector1">
@@ -4291,7 +4296,7 @@
         </p:nvSpPr>
         <p:spPr>
           <a:xfrm>
-            <a:off x="6100343" y="2622197"/>
+            <a:off x="6100343" y="2491567"/>
             <a:ext cx="966652" cy="487492"/>
           </a:xfrm>
           <a:prstGeom prst="roundRect">
@@ -4338,7 +4343,7 @@
         </p:nvSpPr>
         <p:spPr>
           <a:xfrm>
-            <a:off x="5036762" y="2254056"/>
+            <a:off x="5036762" y="2201804"/>
             <a:ext cx="1131025" cy="523220"/>
           </a:xfrm>
           <a:prstGeom prst="rect">
@@ -4373,7 +4378,7 @@
         </p:nvSpPr>
         <p:spPr>
           <a:xfrm>
-            <a:off x="6983175" y="3755771"/>
+            <a:off x="7087679" y="3938653"/>
             <a:ext cx="1821181" cy="1018592"/>
           </a:xfrm>
           <a:prstGeom prst="roundRect">
@@ -4424,7 +4429,7 @@
         </p:nvSpPr>
         <p:spPr>
           <a:xfrm>
-            <a:off x="7909549" y="4413891"/>
+            <a:off x="8014053" y="4675151"/>
             <a:ext cx="254725" cy="96699"/>
           </a:xfrm>
           <a:prstGeom prst="roundRect">
@@ -4468,7 +4473,7 @@
         </p:nvSpPr>
         <p:spPr>
           <a:xfrm>
-            <a:off x="8383080" y="4413891"/>
+            <a:off x="8487584" y="4675151"/>
             <a:ext cx="254725" cy="96699"/>
           </a:xfrm>
           <a:prstGeom prst="roundRect">
@@ -4514,7 +4519,7 @@
         </p:nvCxnSpPr>
         <p:spPr>
           <a:xfrm>
-            <a:off x="8164274" y="4462240"/>
+            <a:off x="8268778" y="4723500"/>
             <a:ext cx="205743" cy="0"/>
           </a:xfrm>
           <a:prstGeom prst="line">
@@ -4547,15 +4552,13 @@
           </p:cNvPr>
           <p:cNvCxnSpPr>
             <a:cxnSpLocks/>
-            <a:stCxn id="74" idx="3"/>
-            <a:endCxn id="80" idx="0"/>
           </p:cNvCxnSpPr>
           <p:nvPr/>
         </p:nvCxnSpPr>
         <p:spPr>
           <a:xfrm>
-            <a:off x="7066995" y="2865943"/>
-            <a:ext cx="826771" cy="889828"/>
+            <a:off x="7093121" y="2735313"/>
+            <a:ext cx="931275" cy="1190277"/>
           </a:xfrm>
           <a:prstGeom prst="bentConnector2">
             <a:avLst/>
@@ -4593,7 +4596,7 @@
         </p:nvSpPr>
         <p:spPr>
           <a:xfrm>
-            <a:off x="6061154" y="5028149"/>
+            <a:off x="6061154" y="5171842"/>
             <a:ext cx="966652" cy="487492"/>
           </a:xfrm>
           <a:prstGeom prst="roundRect">
@@ -4644,8 +4647,8 @@
         </p:nvCxnSpPr>
         <p:spPr>
           <a:xfrm rot="5400000">
-            <a:off x="7212020" y="4590149"/>
-            <a:ext cx="497532" cy="865960"/>
+            <a:off x="7283867" y="4701184"/>
+            <a:ext cx="458343" cy="970464"/>
           </a:xfrm>
           <a:prstGeom prst="bentConnector2">
             <a:avLst/>
@@ -4683,7 +4686,7 @@
         </p:nvSpPr>
         <p:spPr>
           <a:xfrm>
-            <a:off x="7879770" y="4883859"/>
+            <a:off x="7981539" y="5074827"/>
             <a:ext cx="1131025" cy="307777"/>
           </a:xfrm>
           <a:prstGeom prst="rect">
@@ -4721,13 +4724,11 @@
         </p:nvCxnSpPr>
         <p:spPr>
           <a:xfrm rot="5400000" flipH="1" flipV="1">
-            <a:off x="6484366" y="4542403"/>
-            <a:ext cx="545860" cy="425632"/>
-          </a:xfrm>
-          <a:prstGeom prst="bentConnector3">
-            <a:avLst>
-              <a:gd name="adj1" fmla="val 100255"/>
-            </a:avLst>
+            <a:off x="6567734" y="4651898"/>
+            <a:ext cx="496691" cy="543199"/>
+          </a:xfrm>
+          <a:prstGeom prst="bentConnector2">
+            <a:avLst/>
           </a:prstGeom>
           <a:ln>
             <a:tailEnd type="triangle"/>
@@ -4762,7 +4763,7 @@
         </p:nvSpPr>
         <p:spPr>
           <a:xfrm>
-            <a:off x="7913517" y="2910130"/>
+            <a:off x="8018021" y="2910130"/>
             <a:ext cx="1411439" cy="523220"/>
           </a:xfrm>
           <a:prstGeom prst="rect">
@@ -4799,8 +4800,8 @@
         </p:nvCxnSpPr>
         <p:spPr>
           <a:xfrm>
-            <a:off x="9206861" y="2872899"/>
-            <a:ext cx="1218157" cy="0"/>
+            <a:off x="9298093" y="2872899"/>
+            <a:ext cx="1126925" cy="0"/>
           </a:xfrm>
           <a:prstGeom prst="straightConnector1">
             <a:avLst/>
@@ -4885,7 +4886,7 @@
         </p:nvSpPr>
         <p:spPr>
           <a:xfrm>
-            <a:off x="9285031" y="2335188"/>
+            <a:off x="9311157" y="2335188"/>
             <a:ext cx="1317528" cy="523220"/>
           </a:xfrm>
           <a:prstGeom prst="rect">
@@ -4920,7 +4921,7 @@
         </p:nvSpPr>
         <p:spPr>
           <a:xfrm>
-            <a:off x="9226612" y="3195290"/>
+            <a:off x="9252738" y="3234479"/>
             <a:ext cx="1317528" cy="307777"/>
           </a:xfrm>
           <a:prstGeom prst="rect">
@@ -4950,13 +4951,15 @@
               </a:ext>
             </a:extLst>
           </p:cNvPr>
-          <p:cNvCxnSpPr/>
+          <p:cNvCxnSpPr>
+            <a:cxnSpLocks/>
+          </p:cNvCxnSpPr>
           <p:nvPr/>
         </p:nvCxnSpPr>
         <p:spPr>
           <a:xfrm flipH="1">
-            <a:off x="9202928" y="3189736"/>
-            <a:ext cx="1209027" cy="0"/>
+            <a:off x="9298093" y="3189736"/>
+            <a:ext cx="1113864" cy="0"/>
           </a:xfrm>
           <a:prstGeom prst="straightConnector1">
             <a:avLst/>
@@ -4991,14 +4994,15 @@
           </p:cNvPr>
           <p:cNvCxnSpPr>
             <a:cxnSpLocks/>
-            <a:endCxn id="211" idx="4"/>
+            <a:stCxn id="80" idx="1"/>
+            <a:endCxn id="211" idx="3"/>
           </p:cNvCxnSpPr>
           <p:nvPr/>
         </p:nvCxnSpPr>
         <p:spPr>
           <a:xfrm rot="10800000">
-            <a:off x="6311395" y="3686717"/>
-            <a:ext cx="671793" cy="557479"/>
+            <a:off x="6205565" y="3642881"/>
+            <a:ext cx="882114" cy="805069"/>
           </a:xfrm>
           <a:prstGeom prst="bentConnector2">
             <a:avLst/>
@@ -5036,7 +5040,7 @@
         </p:nvSpPr>
         <p:spPr>
           <a:xfrm>
-            <a:off x="5123416" y="3752824"/>
+            <a:off x="5084227" y="3844265"/>
             <a:ext cx="1167425" cy="523220"/>
           </a:xfrm>
           <a:prstGeom prst="rect">
@@ -5107,7 +5111,7 @@
         </p:nvSpPr>
         <p:spPr>
           <a:xfrm>
-            <a:off x="6813455" y="3252823"/>
+            <a:off x="6392876" y="3892943"/>
             <a:ext cx="1131025" cy="307777"/>
           </a:xfrm>
           <a:prstGeom prst="rect">
@@ -5185,18 +5189,17 @@
           </p:cNvPr>
           <p:cNvCxnSpPr>
             <a:cxnSpLocks/>
-            <a:endCxn id="211" idx="6"/>
           </p:cNvCxnSpPr>
           <p:nvPr/>
         </p:nvCxnSpPr>
         <p:spPr>
           <a:xfrm rot="10800000">
-            <a:off x="6461059" y="3537052"/>
-            <a:ext cx="984770" cy="211261"/>
+            <a:off x="6470831" y="3594050"/>
+            <a:ext cx="1262381" cy="326597"/>
           </a:xfrm>
           <a:prstGeom prst="bentConnector3">
             <a:avLst>
-              <a:gd name="adj1" fmla="val -12345"/>
+              <a:gd name="adj1" fmla="val 1365"/>
             </a:avLst>
           </a:prstGeom>
           <a:ln>
@@ -5233,9 +5236,9 @@
           <p:nvPr/>
         </p:nvCxnSpPr>
         <p:spPr>
-          <a:xfrm flipV="1">
-            <a:off x="6302679" y="3109921"/>
-            <a:ext cx="1225" cy="544178"/>
+          <a:xfrm flipH="1" flipV="1">
+            <a:off x="6297702" y="2979059"/>
+            <a:ext cx="4977" cy="675040"/>
           </a:xfrm>
           <a:prstGeom prst="straightConnector1">
             <a:avLst/>
@@ -5259,6 +5262,84 @@
           </a:fontRef>
         </p:style>
       </p:cxnSp>
+      <p:cxnSp>
+        <p:nvCxnSpPr>
+          <p:cNvPr id="251" name="Elbow Connector 250">
+            <a:extLst>
+              <a:ext uri="{FF2B5EF4-FFF2-40B4-BE49-F238E27FC236}">
+                <a16:creationId xmlns:a16="http://schemas.microsoft.com/office/drawing/2014/main" id="{89B21B7E-297A-7141-8669-874044293020}"/>
+              </a:ext>
+            </a:extLst>
+          </p:cNvPr>
+          <p:cNvCxnSpPr>
+            <a:cxnSpLocks/>
+          </p:cNvCxnSpPr>
+          <p:nvPr/>
+        </p:nvCxnSpPr>
+        <p:spPr>
+          <a:xfrm rot="10800000">
+            <a:off x="6378670" y="3663872"/>
+            <a:ext cx="699239" cy="530749"/>
+          </a:xfrm>
+          <a:prstGeom prst="bentConnector3">
+            <a:avLst>
+              <a:gd name="adj1" fmla="val 100440"/>
+            </a:avLst>
+          </a:prstGeom>
+          <a:ln>
+            <a:tailEnd type="triangle"/>
+          </a:ln>
+        </p:spPr>
+        <p:style>
+          <a:lnRef idx="1">
+            <a:schemeClr val="dk1"/>
+          </a:lnRef>
+          <a:fillRef idx="0">
+            <a:schemeClr val="dk1"/>
+          </a:fillRef>
+          <a:effectRef idx="0">
+            <a:schemeClr val="dk1"/>
+          </a:effectRef>
+          <a:fontRef idx="minor">
+            <a:schemeClr val="tx1"/>
+          </a:fontRef>
+        </p:style>
+      </p:cxnSp>
+      <p:sp>
+        <p:nvSpPr>
+          <p:cNvPr id="257" name="TextBox 256">
+            <a:extLst>
+              <a:ext uri="{FF2B5EF4-FFF2-40B4-BE49-F238E27FC236}">
+                <a16:creationId xmlns:a16="http://schemas.microsoft.com/office/drawing/2014/main" id="{3901954D-A47C-9C43-83E3-6CBEC87BCA31}"/>
+              </a:ext>
+            </a:extLst>
+          </p:cNvPr>
+          <p:cNvSpPr txBox="1"/>
+          <p:nvPr/>
+        </p:nvSpPr>
+        <p:spPr>
+          <a:xfrm>
+            <a:off x="6546962" y="3082130"/>
+            <a:ext cx="1450594" cy="523220"/>
+          </a:xfrm>
+          <a:prstGeom prst="rect">
+            <a:avLst/>
+          </a:prstGeom>
+          <a:noFill/>
+        </p:spPr>
+        <p:txBody>
+          <a:bodyPr wrap="square" rtlCol="0">
+            <a:spAutoFit/>
+          </a:bodyPr>
+          <a:lstStyle/>
+          <a:p>
+            <a:r>
+              <a:rPr lang="en-US" sz="1400" dirty="0"/>
+              <a:t>cancel [setting] / clear settings</a:t>
+            </a:r>
+          </a:p>
+        </p:txBody>
+      </p:sp>
     </p:spTree>
     <p:extLst>
       <p:ext uri="{BB962C8B-B14F-4D97-AF65-F5344CB8AC3E}">
@@ -6510,7 +6591,7 @@
           <a:p>
             <a:r>
               <a:rPr lang="en-US" sz="1400" dirty="0"/>
-              <a:t>[mode == short]</a:t>
+              <a:t>[mode is short]</a:t>
             </a:r>
           </a:p>
         </p:txBody>
@@ -6545,7 +6626,7 @@
           <a:p>
             <a:r>
               <a:rPr lang="en-US" sz="1400" dirty="0"/>
-              <a:t>[mode == long]</a:t>
+              <a:t>[mode is long]</a:t>
             </a:r>
           </a:p>
         </p:txBody>
@@ -6887,52 +6968,6 @@
               <a:rPr lang="en-US" sz="1400" dirty="0"/>
               <a:t>after (30 min) </a:t>
             </a:r>
-          </a:p>
-        </p:txBody>
-      </p:sp>
-      <p:sp>
-        <p:nvSpPr>
-          <p:cNvPr id="58" name="Oval 57">
-            <a:extLst>
-              <a:ext uri="{FF2B5EF4-FFF2-40B4-BE49-F238E27FC236}">
-                <a16:creationId xmlns:a16="http://schemas.microsoft.com/office/drawing/2014/main" id="{BCF18E5B-1B65-3540-A010-58A31ADBBA9C}"/>
-              </a:ext>
-            </a:extLst>
-          </p:cNvPr>
-          <p:cNvSpPr/>
-          <p:nvPr/>
-        </p:nvSpPr>
-        <p:spPr>
-          <a:xfrm>
-            <a:off x="8179604" y="2242210"/>
-            <a:ext cx="299330" cy="299330"/>
-          </a:xfrm>
-          <a:prstGeom prst="ellipse">
-            <a:avLst/>
-          </a:prstGeom>
-        </p:spPr>
-        <p:style>
-          <a:lnRef idx="2">
-            <a:schemeClr val="dk1">
-              <a:shade val="50000"/>
-            </a:schemeClr>
-          </a:lnRef>
-          <a:fillRef idx="1">
-            <a:schemeClr val="dk1"/>
-          </a:fillRef>
-          <a:effectRef idx="0">
-            <a:schemeClr val="dk1"/>
-          </a:effectRef>
-          <a:fontRef idx="minor">
-            <a:schemeClr val="lt1"/>
-          </a:fontRef>
-        </p:style>
-        <p:txBody>
-          <a:bodyPr rtlCol="0" anchor="ctr"/>
-          <a:lstStyle/>
-          <a:p>
-            <a:pPr algn="ctr"/>
-            <a:endParaRPr lang="en-US"/>
           </a:p>
         </p:txBody>
       </p:sp>
@@ -7034,8 +7069,8 @@
         </p:nvCxnSpPr>
         <p:spPr>
           <a:xfrm flipV="1">
-            <a:off x="5339750" y="2395699"/>
-            <a:ext cx="740137" cy="4970"/>
+            <a:off x="5579595" y="2395699"/>
+            <a:ext cx="500292" cy="4459"/>
           </a:xfrm>
           <a:prstGeom prst="straightConnector1">
             <a:avLst/>
@@ -7200,48 +7235,7 @@
         <p:spPr>
           <a:xfrm>
             <a:off x="7196577" y="2391597"/>
-            <a:ext cx="969964" cy="279"/>
-          </a:xfrm>
-          <a:prstGeom prst="straightConnector1">
-            <a:avLst/>
-          </a:prstGeom>
-          <a:ln>
-            <a:tailEnd type="triangle"/>
-          </a:ln>
-        </p:spPr>
-        <p:style>
-          <a:lnRef idx="1">
-            <a:schemeClr val="dk1"/>
-          </a:lnRef>
-          <a:fillRef idx="0">
-            <a:schemeClr val="dk1"/>
-          </a:fillRef>
-          <a:effectRef idx="0">
-            <a:schemeClr val="dk1"/>
-          </a:effectRef>
-          <a:fontRef idx="minor">
-            <a:schemeClr val="tx1"/>
-          </a:fontRef>
-        </p:style>
-      </p:cxnSp>
-      <p:cxnSp>
-        <p:nvCxnSpPr>
-          <p:cNvPr id="107" name="Straight Arrow Connector 106">
-            <a:extLst>
-              <a:ext uri="{FF2B5EF4-FFF2-40B4-BE49-F238E27FC236}">
-                <a16:creationId xmlns:a16="http://schemas.microsoft.com/office/drawing/2014/main" id="{CFABE5F4-57E0-F844-87DA-1D5DB706ADDB}"/>
-              </a:ext>
-            </a:extLst>
-          </p:cNvPr>
-          <p:cNvCxnSpPr>
-            <a:cxnSpLocks/>
-          </p:cNvCxnSpPr>
-          <p:nvPr/>
-        </p:nvCxnSpPr>
-        <p:spPr>
-          <a:xfrm>
-            <a:off x="8478209" y="2400158"/>
-            <a:ext cx="249721" cy="0"/>
+            <a:ext cx="1534748" cy="4102"/>
           </a:xfrm>
           <a:prstGeom prst="straightConnector1">
             <a:avLst/>
@@ -7568,7 +7562,7 @@
         </p:nvSpPr>
         <p:spPr>
           <a:xfrm>
-            <a:off x="7175754" y="1988914"/>
+            <a:off x="7412943" y="2054954"/>
             <a:ext cx="1579623" cy="307777"/>
           </a:xfrm>
           <a:prstGeom prst="rect">

</xml_diff>

<commit_message>
Updates to second draft
</commit_message>
<xml_diff>
--- a/Assignment 3/updatedSecondDraft.pptx
+++ b/Assignment 3/updatedSecondDraft.pptx
@@ -4135,8 +4135,8 @@
         </p:nvCxnSpPr>
         <p:spPr>
           <a:xfrm>
-            <a:off x="4728742" y="2030639"/>
-            <a:ext cx="4402184" cy="0"/>
+            <a:off x="4702616" y="2030639"/>
+            <a:ext cx="4523996" cy="0"/>
           </a:xfrm>
           <a:prstGeom prst="line">
             <a:avLst/>
@@ -4552,13 +4552,14 @@
           </p:cNvPr>
           <p:cNvCxnSpPr>
             <a:cxnSpLocks/>
+            <a:stCxn id="74" idx="3"/>
           </p:cNvCxnSpPr>
           <p:nvPr/>
         </p:nvCxnSpPr>
         <p:spPr>
           <a:xfrm>
-            <a:off x="7093121" y="2735313"/>
-            <a:ext cx="931275" cy="1190277"/>
+            <a:off x="7066995" y="2735313"/>
+            <a:ext cx="957401" cy="1190277"/>
           </a:xfrm>
           <a:prstGeom prst="bentConnector2">
             <a:avLst/>
@@ -5194,12 +5195,12 @@
         </p:nvCxnSpPr>
         <p:spPr>
           <a:xfrm rot="10800000">
-            <a:off x="6470831" y="3594050"/>
-            <a:ext cx="1262381" cy="326597"/>
+            <a:off x="6457770" y="3594051"/>
+            <a:ext cx="1249317" cy="344602"/>
           </a:xfrm>
           <a:prstGeom prst="bentConnector3">
             <a:avLst>
-              <a:gd name="adj1" fmla="val 1365"/>
+              <a:gd name="adj1" fmla="val -1234"/>
             </a:avLst>
           </a:prstGeom>
           <a:ln>

</xml_diff>

<commit_message>
Updated mathematical representation for the first diagram
</commit_message>
<xml_diff>
--- a/Assignment 3/updatedSecondDraft.pptx
+++ b/Assignment 3/updatedSecondDraft.pptx
@@ -260,7 +260,7 @@
           <a:p>
             <a:fld id="{0B51B2B2-61EB-F840-97D6-5435ACE1DE3B}" type="datetimeFigureOut">
               <a:rPr lang="en-US" smtClean="0"/>
-              <a:t>4/5/21</a:t>
+              <a:t>4/5/2021</a:t>
             </a:fld>
             <a:endParaRPr lang="en-US"/>
           </a:p>
@@ -458,7 +458,7 @@
           <a:p>
             <a:fld id="{0B51B2B2-61EB-F840-97D6-5435ACE1DE3B}" type="datetimeFigureOut">
               <a:rPr lang="en-US" smtClean="0"/>
-              <a:t>4/5/21</a:t>
+              <a:t>4/5/2021</a:t>
             </a:fld>
             <a:endParaRPr lang="en-US"/>
           </a:p>
@@ -666,7 +666,7 @@
           <a:p>
             <a:fld id="{0B51B2B2-61EB-F840-97D6-5435ACE1DE3B}" type="datetimeFigureOut">
               <a:rPr lang="en-US" smtClean="0"/>
-              <a:t>4/5/21</a:t>
+              <a:t>4/5/2021</a:t>
             </a:fld>
             <a:endParaRPr lang="en-US"/>
           </a:p>
@@ -864,7 +864,7 @@
           <a:p>
             <a:fld id="{0B51B2B2-61EB-F840-97D6-5435ACE1DE3B}" type="datetimeFigureOut">
               <a:rPr lang="en-US" smtClean="0"/>
-              <a:t>4/5/21</a:t>
+              <a:t>4/5/2021</a:t>
             </a:fld>
             <a:endParaRPr lang="en-US"/>
           </a:p>
@@ -1139,7 +1139,7 @@
           <a:p>
             <a:fld id="{0B51B2B2-61EB-F840-97D6-5435ACE1DE3B}" type="datetimeFigureOut">
               <a:rPr lang="en-US" smtClean="0"/>
-              <a:t>4/5/21</a:t>
+              <a:t>4/5/2021</a:t>
             </a:fld>
             <a:endParaRPr lang="en-US"/>
           </a:p>
@@ -1404,7 +1404,7 @@
           <a:p>
             <a:fld id="{0B51B2B2-61EB-F840-97D6-5435ACE1DE3B}" type="datetimeFigureOut">
               <a:rPr lang="en-US" smtClean="0"/>
-              <a:t>4/5/21</a:t>
+              <a:t>4/5/2021</a:t>
             </a:fld>
             <a:endParaRPr lang="en-US"/>
           </a:p>
@@ -1816,7 +1816,7 @@
           <a:p>
             <a:fld id="{0B51B2B2-61EB-F840-97D6-5435ACE1DE3B}" type="datetimeFigureOut">
               <a:rPr lang="en-US" smtClean="0"/>
-              <a:t>4/5/21</a:t>
+              <a:t>4/5/2021</a:t>
             </a:fld>
             <a:endParaRPr lang="en-US"/>
           </a:p>
@@ -1957,7 +1957,7 @@
           <a:p>
             <a:fld id="{0B51B2B2-61EB-F840-97D6-5435ACE1DE3B}" type="datetimeFigureOut">
               <a:rPr lang="en-US" smtClean="0"/>
-              <a:t>4/5/21</a:t>
+              <a:t>4/5/2021</a:t>
             </a:fld>
             <a:endParaRPr lang="en-US"/>
           </a:p>
@@ -2070,7 +2070,7 @@
           <a:p>
             <a:fld id="{0B51B2B2-61EB-F840-97D6-5435ACE1DE3B}" type="datetimeFigureOut">
               <a:rPr lang="en-US" smtClean="0"/>
-              <a:t>4/5/21</a:t>
+              <a:t>4/5/2021</a:t>
             </a:fld>
             <a:endParaRPr lang="en-US"/>
           </a:p>
@@ -2381,7 +2381,7 @@
           <a:p>
             <a:fld id="{0B51B2B2-61EB-F840-97D6-5435ACE1DE3B}" type="datetimeFigureOut">
               <a:rPr lang="en-US" smtClean="0"/>
-              <a:t>4/5/21</a:t>
+              <a:t>4/5/2021</a:t>
             </a:fld>
             <a:endParaRPr lang="en-US"/>
           </a:p>
@@ -2669,7 +2669,7 @@
           <a:p>
             <a:fld id="{0B51B2B2-61EB-F840-97D6-5435ACE1DE3B}" type="datetimeFigureOut">
               <a:rPr lang="en-US" smtClean="0"/>
-              <a:t>4/5/21</a:t>
+              <a:t>4/5/2021</a:t>
             </a:fld>
             <a:endParaRPr lang="en-US"/>
           </a:p>
@@ -2910,7 +2910,7 @@
           <a:p>
             <a:fld id="{0B51B2B2-61EB-F840-97D6-5435ACE1DE3B}" type="datetimeFigureOut">
               <a:rPr lang="en-US" smtClean="0"/>
-              <a:t>4/5/21</a:t>
+              <a:t>4/5/2021</a:t>
             </a:fld>
             <a:endParaRPr lang="en-US"/>
           </a:p>
@@ -4042,7 +4042,7 @@
         </p:nvSpPr>
         <p:spPr>
           <a:xfrm>
-            <a:off x="4643676" y="1634432"/>
+            <a:off x="4739786" y="1647538"/>
             <a:ext cx="4654417" cy="4238884"/>
           </a:xfrm>
           <a:prstGeom prst="roundRect">
@@ -5337,6 +5337,41 @@
             <a:r>
               <a:rPr lang="en-US" sz="1400" dirty="0"/>
               <a:t>cancel [setting] / clear settings</a:t>
+            </a:r>
+          </a:p>
+        </p:txBody>
+      </p:sp>
+      <p:sp>
+        <p:nvSpPr>
+          <p:cNvPr id="53" name="TextBox 52">
+            <a:extLst>
+              <a:ext uri="{FF2B5EF4-FFF2-40B4-BE49-F238E27FC236}">
+                <a16:creationId xmlns:a16="http://schemas.microsoft.com/office/drawing/2014/main" id="{1363CC24-5183-4691-9599-E30EE4B71F56}"/>
+              </a:ext>
+            </a:extLst>
+          </p:cNvPr>
+          <p:cNvSpPr txBox="1"/>
+          <p:nvPr/>
+        </p:nvSpPr>
+        <p:spPr>
+          <a:xfrm>
+            <a:off x="5719941" y="4688658"/>
+            <a:ext cx="1131025" cy="307777"/>
+          </a:xfrm>
+          <a:prstGeom prst="rect">
+            <a:avLst/>
+          </a:prstGeom>
+          <a:noFill/>
+        </p:spPr>
+        <p:txBody>
+          <a:bodyPr wrap="square" rtlCol="0">
+            <a:spAutoFit/>
+          </a:bodyPr>
+          <a:lstStyle/>
+          <a:p>
+            <a:r>
+              <a:rPr lang="en-US" sz="1400" dirty="0"/>
+              <a:t>power on</a:t>
             </a:r>
           </a:p>
         </p:txBody>

</xml_diff>